<commit_message>
Forgot to switch cardinalities in ER...
</commit_message>
<xml_diff>
--- a/assets/presentation/Wrapper Informo.pptx
+++ b/assets/presentation/Wrapper Informo.pptx
@@ -1121,7 +1121,7 @@
   <p:cSld>
     <p:spTree>
       <p:nvGrpSpPr>
-        <p:cNvPr id="136" name="Shape 136"/>
+        <p:cNvPr id="137" name="Shape 137"/>
         <p:cNvGrpSpPr/>
         <p:nvPr/>
       </p:nvGrpSpPr>
@@ -1135,7 +1135,7 @@
       </p:grpSpPr>
       <p:sp>
         <p:nvSpPr>
-          <p:cNvPr id="137" name="Google Shape;137;g87d99d893c_3_9:notes"/>
+          <p:cNvPr id="138" name="Google Shape;138;g87d99d893c_3_9:notes"/>
           <p:cNvSpPr/>
           <p:nvPr>
             <p:ph idx="2" type="sldImg"/>
@@ -1170,7 +1170,7 @@
       </p:sp>
       <p:sp>
         <p:nvSpPr>
-          <p:cNvPr id="138" name="Google Shape;138;g87d99d893c_3_9:notes"/>
+          <p:cNvPr id="139" name="Google Shape;139;g87d99d893c_3_9:notes"/>
           <p:cNvSpPr txBox="1"/>
           <p:nvPr>
             <p:ph idx="1" type="body"/>
@@ -1220,7 +1220,7 @@
   <p:cSld>
     <p:spTree>
       <p:nvGrpSpPr>
-        <p:cNvPr id="143" name="Shape 143"/>
+        <p:cNvPr id="144" name="Shape 144"/>
         <p:cNvGrpSpPr/>
         <p:nvPr/>
       </p:nvGrpSpPr>
@@ -1234,7 +1234,7 @@
       </p:grpSpPr>
       <p:sp>
         <p:nvSpPr>
-          <p:cNvPr id="144" name="Google Shape;144;g87d99d893c_4_55:notes"/>
+          <p:cNvPr id="145" name="Google Shape;145;g87d99d893c_4_55:notes"/>
           <p:cNvSpPr/>
           <p:nvPr>
             <p:ph idx="2" type="sldImg"/>
@@ -1269,7 +1269,7 @@
       </p:sp>
       <p:sp>
         <p:nvSpPr>
-          <p:cNvPr id="145" name="Google Shape;145;g87d99d893c_4_55:notes"/>
+          <p:cNvPr id="146" name="Google Shape;146;g87d99d893c_4_55:notes"/>
           <p:cNvSpPr txBox="1"/>
           <p:nvPr>
             <p:ph idx="1" type="body"/>
@@ -1319,7 +1319,7 @@
   <p:cSld>
     <p:spTree>
       <p:nvGrpSpPr>
-        <p:cNvPr id="149" name="Shape 149"/>
+        <p:cNvPr id="150" name="Shape 150"/>
         <p:cNvGrpSpPr/>
         <p:nvPr/>
       </p:nvGrpSpPr>
@@ -1333,7 +1333,7 @@
       </p:grpSpPr>
       <p:sp>
         <p:nvSpPr>
-          <p:cNvPr id="150" name="Google Shape;150;g87d99d893c_4_1:notes"/>
+          <p:cNvPr id="151" name="Google Shape;151;g87d99d893c_4_1:notes"/>
           <p:cNvSpPr/>
           <p:nvPr>
             <p:ph idx="2" type="sldImg"/>
@@ -1368,7 +1368,7 @@
       </p:sp>
       <p:sp>
         <p:nvSpPr>
-          <p:cNvPr id="151" name="Google Shape;151;g87d99d893c_4_1:notes"/>
+          <p:cNvPr id="152" name="Google Shape;152;g87d99d893c_4_1:notes"/>
           <p:cNvSpPr txBox="1"/>
           <p:nvPr>
             <p:ph idx="1" type="body"/>
@@ -1418,7 +1418,7 @@
   <p:cSld>
     <p:spTree>
       <p:nvGrpSpPr>
-        <p:cNvPr id="155" name="Shape 155"/>
+        <p:cNvPr id="156" name="Shape 156"/>
         <p:cNvGrpSpPr/>
         <p:nvPr/>
       </p:nvGrpSpPr>
@@ -1432,7 +1432,7 @@
       </p:grpSpPr>
       <p:sp>
         <p:nvSpPr>
-          <p:cNvPr id="156" name="Google Shape;156;g87d99d893c_4_94:notes"/>
+          <p:cNvPr id="157" name="Google Shape;157;g87d99d893c_4_94:notes"/>
           <p:cNvSpPr/>
           <p:nvPr>
             <p:ph idx="2" type="sldImg"/>
@@ -1467,7 +1467,7 @@
       </p:sp>
       <p:sp>
         <p:nvSpPr>
-          <p:cNvPr id="157" name="Google Shape;157;g87d99d893c_4_94:notes"/>
+          <p:cNvPr id="158" name="Google Shape;158;g87d99d893c_4_94:notes"/>
           <p:cNvSpPr txBox="1"/>
           <p:nvPr>
             <p:ph idx="1" type="body"/>
@@ -1517,7 +1517,7 @@
   <p:cSld>
     <p:spTree>
       <p:nvGrpSpPr>
-        <p:cNvPr id="160" name="Shape 160"/>
+        <p:cNvPr id="161" name="Shape 161"/>
         <p:cNvGrpSpPr/>
         <p:nvPr/>
       </p:nvGrpSpPr>
@@ -1531,7 +1531,7 @@
       </p:grpSpPr>
       <p:sp>
         <p:nvSpPr>
-          <p:cNvPr id="161" name="Google Shape;161;g87d99d893c_4_78:notes"/>
+          <p:cNvPr id="162" name="Google Shape;162;g87d99d893c_4_78:notes"/>
           <p:cNvSpPr/>
           <p:nvPr>
             <p:ph idx="2" type="sldImg"/>
@@ -1566,7 +1566,7 @@
       </p:sp>
       <p:sp>
         <p:nvSpPr>
-          <p:cNvPr id="162" name="Google Shape;162;g87d99d893c_4_78:notes"/>
+          <p:cNvPr id="163" name="Google Shape;163;g87d99d893c_4_78:notes"/>
           <p:cNvSpPr txBox="1"/>
           <p:nvPr>
             <p:ph idx="1" type="body"/>
@@ -1616,7 +1616,7 @@
   <p:cSld>
     <p:spTree>
       <p:nvGrpSpPr>
-        <p:cNvPr id="169" name="Shape 169"/>
+        <p:cNvPr id="170" name="Shape 170"/>
         <p:cNvGrpSpPr/>
         <p:nvPr/>
       </p:nvGrpSpPr>
@@ -1630,7 +1630,7 @@
       </p:grpSpPr>
       <p:sp>
         <p:nvSpPr>
-          <p:cNvPr id="170" name="Google Shape;170;g87d99d893c_4_98:notes"/>
+          <p:cNvPr id="171" name="Google Shape;171;g87d99d893c_4_98:notes"/>
           <p:cNvSpPr/>
           <p:nvPr>
             <p:ph idx="2" type="sldImg"/>
@@ -1665,7 +1665,7 @@
       </p:sp>
       <p:sp>
         <p:nvSpPr>
-          <p:cNvPr id="171" name="Google Shape;171;g87d99d893c_4_98:notes"/>
+          <p:cNvPr id="172" name="Google Shape;172;g87d99d893c_4_98:notes"/>
           <p:cNvSpPr txBox="1"/>
           <p:nvPr>
             <p:ph idx="1" type="body"/>
@@ -1715,7 +1715,7 @@
   <p:cSld>
     <p:spTree>
       <p:nvGrpSpPr>
-        <p:cNvPr id="186" name="Shape 186"/>
+        <p:cNvPr id="187" name="Shape 187"/>
         <p:cNvGrpSpPr/>
         <p:nvPr/>
       </p:nvGrpSpPr>
@@ -1729,7 +1729,7 @@
       </p:grpSpPr>
       <p:sp>
         <p:nvSpPr>
-          <p:cNvPr id="187" name="Google Shape;187;g87d99d893c_3_14:notes"/>
+          <p:cNvPr id="188" name="Google Shape;188;g87d99d893c_3_14:notes"/>
           <p:cNvSpPr/>
           <p:nvPr>
             <p:ph idx="2" type="sldImg"/>
@@ -1764,7 +1764,7 @@
       </p:sp>
       <p:sp>
         <p:nvSpPr>
-          <p:cNvPr id="188" name="Google Shape;188;g87d99d893c_3_14:notes"/>
+          <p:cNvPr id="189" name="Google Shape;189;g87d99d893c_3_14:notes"/>
           <p:cNvSpPr txBox="1"/>
           <p:nvPr>
             <p:ph idx="1" type="body"/>
@@ -1913,7 +1913,7 @@
   <p:cSld>
     <p:spTree>
       <p:nvGrpSpPr>
-        <p:cNvPr id="191" name="Shape 191"/>
+        <p:cNvPr id="192" name="Shape 192"/>
         <p:cNvGrpSpPr/>
         <p:nvPr/>
       </p:nvGrpSpPr>
@@ -1927,7 +1927,7 @@
       </p:grpSpPr>
       <p:sp>
         <p:nvSpPr>
-          <p:cNvPr id="192" name="Google Shape;192;gc6f73a04f_0_9:notes"/>
+          <p:cNvPr id="193" name="Google Shape;193;gc6f73a04f_0_9:notes"/>
           <p:cNvSpPr/>
           <p:nvPr>
             <p:ph idx="2" type="sldImg"/>
@@ -1962,7 +1962,7 @@
       </p:sp>
       <p:sp>
         <p:nvSpPr>
-          <p:cNvPr id="193" name="Google Shape;193;gc6f73a04f_0_9:notes"/>
+          <p:cNvPr id="194" name="Google Shape;194;gc6f73a04f_0_9:notes"/>
           <p:cNvSpPr txBox="1"/>
           <p:nvPr>
             <p:ph idx="1" type="body"/>
@@ -2012,7 +2012,7 @@
   <p:cSld>
     <p:spTree>
       <p:nvGrpSpPr>
-        <p:cNvPr id="197" name="Shape 197"/>
+        <p:cNvPr id="198" name="Shape 198"/>
         <p:cNvGrpSpPr/>
         <p:nvPr/>
       </p:nvGrpSpPr>
@@ -2026,7 +2026,7 @@
       </p:grpSpPr>
       <p:sp>
         <p:nvSpPr>
-          <p:cNvPr id="198" name="Google Shape;198;g87dc6f71ba_0_5:notes"/>
+          <p:cNvPr id="199" name="Google Shape;199;g87dc6f71ba_0_5:notes"/>
           <p:cNvSpPr/>
           <p:nvPr>
             <p:ph idx="2" type="sldImg"/>
@@ -2061,7 +2061,7 @@
       </p:sp>
       <p:sp>
         <p:nvSpPr>
-          <p:cNvPr id="199" name="Google Shape;199;g87dc6f71ba_0_5:notes"/>
+          <p:cNvPr id="200" name="Google Shape;200;g87dc6f71ba_0_5:notes"/>
           <p:cNvSpPr txBox="1"/>
           <p:nvPr>
             <p:ph idx="1" type="body"/>
@@ -2111,7 +2111,7 @@
   <p:cSld>
     <p:spTree>
       <p:nvGrpSpPr>
-        <p:cNvPr id="206" name="Shape 206"/>
+        <p:cNvPr id="207" name="Shape 207"/>
         <p:cNvGrpSpPr/>
         <p:nvPr/>
       </p:nvGrpSpPr>
@@ -2125,7 +2125,7 @@
       </p:grpSpPr>
       <p:sp>
         <p:nvSpPr>
-          <p:cNvPr id="207" name="Google Shape;207;g87dc6f71ba_0_10:notes"/>
+          <p:cNvPr id="208" name="Google Shape;208;g87dc6f71ba_0_10:notes"/>
           <p:cNvSpPr/>
           <p:nvPr>
             <p:ph idx="2" type="sldImg"/>
@@ -2160,7 +2160,7 @@
       </p:sp>
       <p:sp>
         <p:nvSpPr>
-          <p:cNvPr id="208" name="Google Shape;208;g87dc6f71ba_0_10:notes"/>
+          <p:cNvPr id="209" name="Google Shape;209;g87dc6f71ba_0_10:notes"/>
           <p:cNvSpPr txBox="1"/>
           <p:nvPr>
             <p:ph idx="1" type="body"/>
@@ -2210,7 +2210,7 @@
   <p:cSld>
     <p:spTree>
       <p:nvGrpSpPr>
-        <p:cNvPr id="227" name="Shape 227"/>
+        <p:cNvPr id="228" name="Shape 228"/>
         <p:cNvGrpSpPr/>
         <p:nvPr/>
       </p:nvGrpSpPr>
@@ -2224,7 +2224,7 @@
       </p:grpSpPr>
       <p:sp>
         <p:nvSpPr>
-          <p:cNvPr id="228" name="Google Shape;228;g87d99d893c_4_126:notes"/>
+          <p:cNvPr id="229" name="Google Shape;229;g87d99d893c_4_126:notes"/>
           <p:cNvSpPr/>
           <p:nvPr>
             <p:ph idx="2" type="sldImg"/>
@@ -2259,7 +2259,7 @@
       </p:sp>
       <p:sp>
         <p:nvSpPr>
-          <p:cNvPr id="229" name="Google Shape;229;g87d99d893c_4_126:notes"/>
+          <p:cNvPr id="230" name="Google Shape;230;g87d99d893c_4_126:notes"/>
           <p:cNvSpPr txBox="1"/>
           <p:nvPr>
             <p:ph idx="1" type="body"/>
@@ -2309,7 +2309,7 @@
   <p:cSld>
     <p:spTree>
       <p:nvGrpSpPr>
-        <p:cNvPr id="233" name="Shape 233"/>
+        <p:cNvPr id="234" name="Shape 234"/>
         <p:cNvGrpSpPr/>
         <p:nvPr/>
       </p:nvGrpSpPr>
@@ -2323,7 +2323,7 @@
       </p:grpSpPr>
       <p:sp>
         <p:nvSpPr>
-          <p:cNvPr id="234" name="Google Shape;234;g87d99d893c_4_116:notes"/>
+          <p:cNvPr id="235" name="Google Shape;235;g87d99d893c_4_116:notes"/>
           <p:cNvSpPr/>
           <p:nvPr>
             <p:ph idx="2" type="sldImg"/>
@@ -2358,7 +2358,7 @@
       </p:sp>
       <p:sp>
         <p:nvSpPr>
-          <p:cNvPr id="235" name="Google Shape;235;g87d99d893c_4_116:notes"/>
+          <p:cNvPr id="236" name="Google Shape;236;g87d99d893c_4_116:notes"/>
           <p:cNvSpPr txBox="1"/>
           <p:nvPr>
             <p:ph idx="1" type="body"/>
@@ -2420,7 +2420,7 @@
   <p:cSld>
     <p:spTree>
       <p:nvGrpSpPr>
-        <p:cNvPr id="260" name="Shape 260"/>
+        <p:cNvPr id="261" name="Shape 261"/>
         <p:cNvGrpSpPr/>
         <p:nvPr/>
       </p:nvGrpSpPr>
@@ -2434,7 +2434,7 @@
       </p:grpSpPr>
       <p:sp>
         <p:nvSpPr>
-          <p:cNvPr id="261" name="Google Shape;261;g87dc6f71ba_0_63:notes"/>
+          <p:cNvPr id="262" name="Google Shape;262;g87dc6f71ba_0_63:notes"/>
           <p:cNvSpPr/>
           <p:nvPr>
             <p:ph idx="2" type="sldImg"/>
@@ -2469,7 +2469,7 @@
       </p:sp>
       <p:sp>
         <p:nvSpPr>
-          <p:cNvPr id="262" name="Google Shape;262;g87dc6f71ba_0_63:notes"/>
+          <p:cNvPr id="263" name="Google Shape;263;g87dc6f71ba_0_63:notes"/>
           <p:cNvSpPr txBox="1"/>
           <p:nvPr>
             <p:ph idx="1" type="body"/>
@@ -2519,7 +2519,7 @@
   <p:cSld>
     <p:spTree>
       <p:nvGrpSpPr>
-        <p:cNvPr id="275" name="Shape 275"/>
+        <p:cNvPr id="276" name="Shape 276"/>
         <p:cNvGrpSpPr/>
         <p:nvPr/>
       </p:nvGrpSpPr>
@@ -2533,7 +2533,7 @@
       </p:grpSpPr>
       <p:sp>
         <p:nvSpPr>
-          <p:cNvPr id="276" name="Google Shape;276;g87d99d893c_4_121:notes"/>
+          <p:cNvPr id="277" name="Google Shape;277;g87d99d893c_4_121:notes"/>
           <p:cNvSpPr/>
           <p:nvPr>
             <p:ph idx="2" type="sldImg"/>
@@ -2568,7 +2568,7 @@
       </p:sp>
       <p:sp>
         <p:nvSpPr>
-          <p:cNvPr id="277" name="Google Shape;277;g87d99d893c_4_121:notes"/>
+          <p:cNvPr id="278" name="Google Shape;278;g87d99d893c_4_121:notes"/>
           <p:cNvSpPr txBox="1"/>
           <p:nvPr>
             <p:ph idx="1" type="body"/>
@@ -9621,6 +9621,34 @@
           </a:ln>
         </p:spPr>
       </p:pic>
+      <p:pic>
+        <p:nvPicPr>
+          <p:cNvPr id="136" name="Google Shape;136;p24"/>
+          <p:cNvPicPr preferRelativeResize="0"/>
+          <p:nvPr/>
+        </p:nvPicPr>
+        <p:blipFill>
+          <a:blip r:embed="rId5">
+            <a:alphaModFix/>
+          </a:blip>
+          <a:stretch>
+            <a:fillRect/>
+          </a:stretch>
+        </p:blipFill>
+        <p:spPr>
+          <a:xfrm>
+            <a:off x="1831894" y="152400"/>
+            <a:ext cx="5045375" cy="4838677"/>
+          </a:xfrm>
+          <a:prstGeom prst="rect">
+            <a:avLst/>
+          </a:prstGeom>
+          <a:noFill/>
+          <a:ln>
+            <a:noFill/>
+          </a:ln>
+        </p:spPr>
+      </p:pic>
     </p:spTree>
   </p:cSld>
   <p:clrMapOvr>
@@ -9634,7 +9662,7 @@
   <p:cSld>
     <p:spTree>
       <p:nvGrpSpPr>
-        <p:cNvPr id="139" name="Shape 139"/>
+        <p:cNvPr id="140" name="Shape 140"/>
         <p:cNvGrpSpPr/>
         <p:nvPr/>
       </p:nvGrpSpPr>
@@ -9648,7 +9676,7 @@
       </p:grpSpPr>
       <p:sp>
         <p:nvSpPr>
-          <p:cNvPr id="140" name="Google Shape;140;p25"/>
+          <p:cNvPr id="141" name="Google Shape;141;p25"/>
           <p:cNvSpPr txBox="1"/>
           <p:nvPr>
             <p:ph type="title"/>
@@ -9688,7 +9716,7 @@
       </p:sp>
       <p:sp>
         <p:nvSpPr>
-          <p:cNvPr id="141" name="Google Shape;141;p25"/>
+          <p:cNvPr id="142" name="Google Shape;142;p25"/>
           <p:cNvSpPr txBox="1"/>
           <p:nvPr>
             <p:ph idx="1" type="body"/>
@@ -9743,7 +9771,7 @@
       </p:sp>
       <p:pic>
         <p:nvPicPr>
-          <p:cNvPr id="142" name="Google Shape;142;p25"/>
+          <p:cNvPr id="143" name="Google Shape;143;p25"/>
           <p:cNvPicPr preferRelativeResize="0"/>
           <p:nvPr/>
         </p:nvPicPr>
@@ -9781,7 +9809,7 @@
   <p:cSld>
     <p:spTree>
       <p:nvGrpSpPr>
-        <p:cNvPr id="146" name="Shape 146"/>
+        <p:cNvPr id="147" name="Shape 147"/>
         <p:cNvGrpSpPr/>
         <p:nvPr/>
       </p:nvGrpSpPr>
@@ -9795,7 +9823,7 @@
       </p:grpSpPr>
       <p:sp>
         <p:nvSpPr>
-          <p:cNvPr id="147" name="Google Shape;147;p26"/>
+          <p:cNvPr id="148" name="Google Shape;148;p26"/>
           <p:cNvSpPr txBox="1"/>
           <p:nvPr>
             <p:ph type="title"/>
@@ -9835,7 +9863,7 @@
       </p:sp>
       <p:sp>
         <p:nvSpPr>
-          <p:cNvPr id="148" name="Google Shape;148;p26"/>
+          <p:cNvPr id="149" name="Google Shape;149;p26"/>
           <p:cNvSpPr txBox="1"/>
           <p:nvPr>
             <p:ph idx="1" type="body"/>
@@ -9917,7 +9945,7 @@
   <p:cSld>
     <p:spTree>
       <p:nvGrpSpPr>
-        <p:cNvPr id="152" name="Shape 152"/>
+        <p:cNvPr id="153" name="Shape 153"/>
         <p:cNvGrpSpPr/>
         <p:nvPr/>
       </p:nvGrpSpPr>
@@ -9931,7 +9959,7 @@
       </p:grpSpPr>
       <p:sp>
         <p:nvSpPr>
-          <p:cNvPr id="153" name="Google Shape;153;p27"/>
+          <p:cNvPr id="154" name="Google Shape;154;p27"/>
           <p:cNvSpPr txBox="1"/>
           <p:nvPr>
             <p:ph type="title"/>
@@ -9971,7 +9999,7 @@
       </p:sp>
       <p:sp>
         <p:nvSpPr>
-          <p:cNvPr id="154" name="Google Shape;154;p27"/>
+          <p:cNvPr id="155" name="Google Shape;155;p27"/>
           <p:cNvSpPr txBox="1"/>
           <p:nvPr>
             <p:ph idx="1" type="body"/>
@@ -10022,7 +10050,7 @@
   <p:cSld>
     <p:spTree>
       <p:nvGrpSpPr>
-        <p:cNvPr id="158" name="Shape 158"/>
+        <p:cNvPr id="159" name="Shape 159"/>
         <p:cNvGrpSpPr/>
         <p:nvPr/>
       </p:nvGrpSpPr>
@@ -10036,7 +10064,7 @@
       </p:grpSpPr>
       <p:sp>
         <p:nvSpPr>
-          <p:cNvPr id="159" name="Google Shape;159;p28"/>
+          <p:cNvPr id="160" name="Google Shape;160;p28"/>
           <p:cNvSpPr txBox="1"/>
           <p:nvPr>
             <p:ph type="title"/>
@@ -10087,7 +10115,7 @@
   <p:cSld>
     <p:spTree>
       <p:nvGrpSpPr>
-        <p:cNvPr id="163" name="Shape 163"/>
+        <p:cNvPr id="164" name="Shape 164"/>
         <p:cNvGrpSpPr/>
         <p:nvPr/>
       </p:nvGrpSpPr>
@@ -10101,7 +10129,7 @@
       </p:grpSpPr>
       <p:sp>
         <p:nvSpPr>
-          <p:cNvPr id="164" name="Google Shape;164;p29"/>
+          <p:cNvPr id="165" name="Google Shape;165;p29"/>
           <p:cNvSpPr txBox="1"/>
           <p:nvPr/>
         </p:nvSpPr>
@@ -10153,7 +10181,7 @@
       </p:sp>
       <p:pic>
         <p:nvPicPr>
-          <p:cNvPr id="165" name="Google Shape;165;p29"/>
+          <p:cNvPr id="166" name="Google Shape;166;p29"/>
           <p:cNvPicPr preferRelativeResize="0"/>
           <p:nvPr/>
         </p:nvPicPr>
@@ -10181,7 +10209,7 @@
       </p:pic>
       <p:sp>
         <p:nvSpPr>
-          <p:cNvPr id="166" name="Google Shape;166;p29"/>
+          <p:cNvPr id="167" name="Google Shape;167;p29"/>
           <p:cNvSpPr/>
           <p:nvPr/>
         </p:nvSpPr>
@@ -10231,7 +10259,7 @@
       </p:sp>
       <p:sp>
         <p:nvSpPr>
-          <p:cNvPr id="167" name="Google Shape;167;p29"/>
+          <p:cNvPr id="168" name="Google Shape;168;p29"/>
           <p:cNvSpPr/>
           <p:nvPr/>
         </p:nvSpPr>
@@ -10281,7 +10309,7 @@
       </p:sp>
       <p:sp>
         <p:nvSpPr>
-          <p:cNvPr id="168" name="Google Shape;168;p29"/>
+          <p:cNvPr id="169" name="Google Shape;169;p29"/>
           <p:cNvSpPr txBox="1"/>
           <p:nvPr/>
         </p:nvSpPr>
@@ -10344,7 +10372,7 @@
   <p:cSld>
     <p:spTree>
       <p:nvGrpSpPr>
-        <p:cNvPr id="172" name="Shape 172"/>
+        <p:cNvPr id="173" name="Shape 173"/>
         <p:cNvGrpSpPr/>
         <p:nvPr/>
       </p:nvGrpSpPr>
@@ -10358,7 +10386,7 @@
       </p:grpSpPr>
       <p:pic>
         <p:nvPicPr>
-          <p:cNvPr id="173" name="Google Shape;173;p30"/>
+          <p:cNvPr id="174" name="Google Shape;174;p30"/>
           <p:cNvPicPr preferRelativeResize="0"/>
           <p:nvPr/>
         </p:nvPicPr>
@@ -10386,7 +10414,7 @@
       </p:pic>
       <p:sp>
         <p:nvSpPr>
-          <p:cNvPr id="174" name="Google Shape;174;p30"/>
+          <p:cNvPr id="175" name="Google Shape;175;p30"/>
           <p:cNvSpPr/>
           <p:nvPr/>
         </p:nvSpPr>
@@ -10436,7 +10464,7 @@
       </p:sp>
       <p:sp>
         <p:nvSpPr>
-          <p:cNvPr id="175" name="Google Shape;175;p30"/>
+          <p:cNvPr id="176" name="Google Shape;176;p30"/>
           <p:cNvSpPr txBox="1"/>
           <p:nvPr/>
         </p:nvSpPr>
@@ -10488,7 +10516,7 @@
       </p:sp>
       <p:sp>
         <p:nvSpPr>
-          <p:cNvPr id="176" name="Google Shape;176;p30"/>
+          <p:cNvPr id="177" name="Google Shape;177;p30"/>
           <p:cNvSpPr/>
           <p:nvPr/>
         </p:nvSpPr>
@@ -10538,7 +10566,7 @@
       </p:sp>
       <p:sp>
         <p:nvSpPr>
-          <p:cNvPr id="177" name="Google Shape;177;p30"/>
+          <p:cNvPr id="178" name="Google Shape;178;p30"/>
           <p:cNvSpPr txBox="1"/>
           <p:nvPr/>
         </p:nvSpPr>
@@ -10590,7 +10618,7 @@
       </p:sp>
       <p:sp>
         <p:nvSpPr>
-          <p:cNvPr id="178" name="Google Shape;178;p30"/>
+          <p:cNvPr id="179" name="Google Shape;179;p30"/>
           <p:cNvSpPr/>
           <p:nvPr/>
         </p:nvSpPr>
@@ -10640,7 +10668,7 @@
       </p:sp>
       <p:sp>
         <p:nvSpPr>
-          <p:cNvPr id="179" name="Google Shape;179;p30"/>
+          <p:cNvPr id="180" name="Google Shape;180;p30"/>
           <p:cNvSpPr/>
           <p:nvPr/>
         </p:nvSpPr>
@@ -10690,7 +10718,7 @@
       </p:sp>
       <p:sp>
         <p:nvSpPr>
-          <p:cNvPr id="180" name="Google Shape;180;p30"/>
+          <p:cNvPr id="181" name="Google Shape;181;p30"/>
           <p:cNvSpPr txBox="1"/>
           <p:nvPr/>
         </p:nvSpPr>
@@ -10742,7 +10770,7 @@
       </p:sp>
       <p:sp>
         <p:nvSpPr>
-          <p:cNvPr id="181" name="Google Shape;181;p30"/>
+          <p:cNvPr id="182" name="Google Shape;182;p30"/>
           <p:cNvSpPr txBox="1"/>
           <p:nvPr/>
         </p:nvSpPr>
@@ -10794,7 +10822,7 @@
       </p:sp>
       <p:sp>
         <p:nvSpPr>
-          <p:cNvPr id="182" name="Google Shape;182;p30"/>
+          <p:cNvPr id="183" name="Google Shape;183;p30"/>
           <p:cNvSpPr txBox="1"/>
           <p:nvPr/>
         </p:nvSpPr>
@@ -10846,7 +10874,7 @@
       </p:sp>
       <p:pic>
         <p:nvPicPr>
-          <p:cNvPr id="183" name="Google Shape;183;p30"/>
+          <p:cNvPr id="184" name="Google Shape;184;p30"/>
           <p:cNvPicPr preferRelativeResize="0"/>
           <p:nvPr/>
         </p:nvPicPr>
@@ -10873,7 +10901,7 @@
       </p:pic>
       <p:sp>
         <p:nvSpPr>
-          <p:cNvPr id="184" name="Google Shape;184;p30"/>
+          <p:cNvPr id="185" name="Google Shape;185;p30"/>
           <p:cNvSpPr/>
           <p:nvPr/>
         </p:nvSpPr>
@@ -10923,7 +10951,7 @@
       </p:sp>
       <p:sp>
         <p:nvSpPr>
-          <p:cNvPr id="185" name="Google Shape;185;p30"/>
+          <p:cNvPr id="186" name="Google Shape;186;p30"/>
           <p:cNvSpPr txBox="1"/>
           <p:nvPr/>
         </p:nvSpPr>
@@ -10986,7 +11014,7 @@
   <p:cSld>
     <p:spTree>
       <p:nvGrpSpPr>
-        <p:cNvPr id="189" name="Shape 189"/>
+        <p:cNvPr id="190" name="Shape 190"/>
         <p:cNvGrpSpPr/>
         <p:nvPr/>
       </p:nvGrpSpPr>
@@ -11000,7 +11028,7 @@
       </p:grpSpPr>
       <p:sp>
         <p:nvSpPr>
-          <p:cNvPr id="190" name="Google Shape;190;p31"/>
+          <p:cNvPr id="191" name="Google Shape;191;p31"/>
           <p:cNvSpPr txBox="1"/>
           <p:nvPr>
             <p:ph type="title"/>
@@ -11116,7 +11144,7 @@
   <p:cSld>
     <p:spTree>
       <p:nvGrpSpPr>
-        <p:cNvPr id="194" name="Shape 194"/>
+        <p:cNvPr id="195" name="Shape 195"/>
         <p:cNvGrpSpPr/>
         <p:nvPr/>
       </p:nvGrpSpPr>
@@ -11130,7 +11158,7 @@
       </p:grpSpPr>
       <p:sp>
         <p:nvSpPr>
-          <p:cNvPr id="195" name="Google Shape;195;p32"/>
+          <p:cNvPr id="196" name="Google Shape;196;p32"/>
           <p:cNvSpPr txBox="1"/>
           <p:nvPr>
             <p:ph type="title"/>
@@ -11170,7 +11198,7 @@
       </p:sp>
       <p:sp>
         <p:nvSpPr>
-          <p:cNvPr id="196" name="Google Shape;196;p32"/>
+          <p:cNvPr id="197" name="Google Shape;197;p32"/>
           <p:cNvSpPr txBox="1"/>
           <p:nvPr>
             <p:ph idx="1" type="body"/>
@@ -11263,7 +11291,7 @@
   <p:cSld>
     <p:spTree>
       <p:nvGrpSpPr>
-        <p:cNvPr id="200" name="Shape 200"/>
+        <p:cNvPr id="201" name="Shape 201"/>
         <p:cNvGrpSpPr/>
         <p:nvPr/>
       </p:nvGrpSpPr>
@@ -11277,7 +11305,7 @@
       </p:grpSpPr>
       <p:sp>
         <p:nvSpPr>
-          <p:cNvPr id="201" name="Google Shape;201;p33"/>
+          <p:cNvPr id="202" name="Google Shape;202;p33"/>
           <p:cNvSpPr txBox="1"/>
           <p:nvPr>
             <p:ph type="title"/>
@@ -11317,7 +11345,7 @@
       </p:sp>
       <p:sp>
         <p:nvSpPr>
-          <p:cNvPr id="202" name="Google Shape;202;p33"/>
+          <p:cNvPr id="203" name="Google Shape;203;p33"/>
           <p:cNvSpPr txBox="1"/>
           <p:nvPr>
             <p:ph idx="1" type="body"/>
@@ -11357,7 +11385,7 @@
       </p:sp>
       <p:sp>
         <p:nvSpPr>
-          <p:cNvPr id="203" name="Google Shape;203;p33"/>
+          <p:cNvPr id="204" name="Google Shape;204;p33"/>
           <p:cNvSpPr/>
           <p:nvPr/>
         </p:nvSpPr>
@@ -11405,7 +11433,7 @@
       </p:sp>
       <p:sp>
         <p:nvSpPr>
-          <p:cNvPr id="204" name="Google Shape;204;p33"/>
+          <p:cNvPr id="205" name="Google Shape;205;p33"/>
           <p:cNvSpPr/>
           <p:nvPr/>
         </p:nvSpPr>
@@ -11453,10 +11481,10 @@
       </p:sp>
       <p:cxnSp>
         <p:nvCxnSpPr>
-          <p:cNvPr id="205" name="Google Shape;205;p33"/>
+          <p:cNvPr id="206" name="Google Shape;206;p33"/>
           <p:cNvCxnSpPr>
-            <a:stCxn id="203" idx="3"/>
-            <a:endCxn id="204" idx="1"/>
+            <a:stCxn id="204" idx="3"/>
+            <a:endCxn id="205" idx="1"/>
           </p:cNvCxnSpPr>
           <p:nvPr/>
         </p:nvCxnSpPr>
@@ -11493,7 +11521,7 @@
   <p:cSld>
     <p:spTree>
       <p:nvGrpSpPr>
-        <p:cNvPr id="209" name="Shape 209"/>
+        <p:cNvPr id="210" name="Shape 210"/>
         <p:cNvGrpSpPr/>
         <p:nvPr/>
       </p:nvGrpSpPr>
@@ -11507,7 +11535,7 @@
       </p:grpSpPr>
       <p:sp>
         <p:nvSpPr>
-          <p:cNvPr id="210" name="Google Shape;210;p34"/>
+          <p:cNvPr id="211" name="Google Shape;211;p34"/>
           <p:cNvSpPr txBox="1"/>
           <p:nvPr>
             <p:ph type="title"/>
@@ -11547,7 +11575,7 @@
       </p:sp>
       <p:sp>
         <p:nvSpPr>
-          <p:cNvPr id="211" name="Google Shape;211;p34"/>
+          <p:cNvPr id="212" name="Google Shape;212;p34"/>
           <p:cNvSpPr txBox="1"/>
           <p:nvPr>
             <p:ph idx="1" type="body"/>
@@ -11587,7 +11615,7 @@
       </p:sp>
       <p:sp>
         <p:nvSpPr>
-          <p:cNvPr id="212" name="Google Shape;212;p34"/>
+          <p:cNvPr id="213" name="Google Shape;213;p34"/>
           <p:cNvSpPr/>
           <p:nvPr/>
         </p:nvSpPr>
@@ -11635,7 +11663,7 @@
       </p:sp>
       <p:sp>
         <p:nvSpPr>
-          <p:cNvPr id="213" name="Google Shape;213;p34"/>
+          <p:cNvPr id="214" name="Google Shape;214;p34"/>
           <p:cNvSpPr/>
           <p:nvPr/>
         </p:nvSpPr>
@@ -11683,7 +11711,7 @@
       </p:sp>
       <p:sp>
         <p:nvSpPr>
-          <p:cNvPr id="214" name="Google Shape;214;p34"/>
+          <p:cNvPr id="215" name="Google Shape;215;p34"/>
           <p:cNvSpPr/>
           <p:nvPr/>
         </p:nvSpPr>
@@ -11731,10 +11759,10 @@
       </p:sp>
       <p:cxnSp>
         <p:nvCxnSpPr>
-          <p:cNvPr id="215" name="Google Shape;215;p34"/>
+          <p:cNvPr id="216" name="Google Shape;216;p34"/>
           <p:cNvCxnSpPr>
-            <a:stCxn id="212" idx="3"/>
-            <a:endCxn id="216" idx="1"/>
+            <a:stCxn id="213" idx="3"/>
+            <a:endCxn id="217" idx="1"/>
           </p:cNvCxnSpPr>
           <p:nvPr/>
         </p:nvCxnSpPr>
@@ -11760,10 +11788,10 @@
       </p:cxnSp>
       <p:cxnSp>
         <p:nvCxnSpPr>
-          <p:cNvPr id="217" name="Google Shape;217;p34"/>
+          <p:cNvPr id="218" name="Google Shape;218;p34"/>
           <p:cNvCxnSpPr>
-            <a:stCxn id="216" idx="3"/>
-            <a:endCxn id="213" idx="0"/>
+            <a:stCxn id="217" idx="3"/>
+            <a:endCxn id="214" idx="0"/>
           </p:cNvCxnSpPr>
           <p:nvPr/>
         </p:nvCxnSpPr>
@@ -11789,10 +11817,10 @@
       </p:cxnSp>
       <p:cxnSp>
         <p:nvCxnSpPr>
-          <p:cNvPr id="218" name="Google Shape;218;p34"/>
+          <p:cNvPr id="219" name="Google Shape;219;p34"/>
           <p:cNvCxnSpPr>
-            <a:stCxn id="213" idx="1"/>
-            <a:endCxn id="214" idx="3"/>
+            <a:stCxn id="214" idx="1"/>
+            <a:endCxn id="215" idx="3"/>
           </p:cNvCxnSpPr>
           <p:nvPr/>
         </p:nvCxnSpPr>
@@ -11818,10 +11846,10 @@
       </p:cxnSp>
       <p:cxnSp>
         <p:nvCxnSpPr>
-          <p:cNvPr id="219" name="Google Shape;219;p34"/>
+          <p:cNvPr id="220" name="Google Shape;220;p34"/>
           <p:cNvCxnSpPr>
-            <a:stCxn id="214" idx="0"/>
-            <a:endCxn id="216" idx="1"/>
+            <a:stCxn id="215" idx="0"/>
+            <a:endCxn id="217" idx="1"/>
           </p:cNvCxnSpPr>
           <p:nvPr/>
         </p:nvCxnSpPr>
@@ -11847,7 +11875,7 @@
       </p:cxnSp>
       <p:sp>
         <p:nvSpPr>
-          <p:cNvPr id="220" name="Google Shape;220;p34"/>
+          <p:cNvPr id="221" name="Google Shape;221;p34"/>
           <p:cNvSpPr/>
           <p:nvPr/>
         </p:nvSpPr>
@@ -11895,10 +11923,10 @@
       </p:sp>
       <p:cxnSp>
         <p:nvCxnSpPr>
-          <p:cNvPr id="221" name="Google Shape;221;p34"/>
+          <p:cNvPr id="222" name="Google Shape;222;p34"/>
           <p:cNvCxnSpPr>
-            <a:stCxn id="216" idx="3"/>
-            <a:endCxn id="220" idx="1"/>
+            <a:stCxn id="217" idx="3"/>
+            <a:endCxn id="221" idx="1"/>
           </p:cNvCxnSpPr>
           <p:nvPr/>
         </p:nvCxnSpPr>
@@ -11924,7 +11952,7 @@
       </p:cxnSp>
       <p:sp>
         <p:nvSpPr>
-          <p:cNvPr id="222" name="Google Shape;222;p34"/>
+          <p:cNvPr id="223" name="Google Shape;223;p34"/>
           <p:cNvSpPr txBox="1"/>
           <p:nvPr/>
         </p:nvSpPr>
@@ -11996,7 +12024,7 @@
       </p:sp>
       <p:sp>
         <p:nvSpPr>
-          <p:cNvPr id="223" name="Google Shape;223;p34"/>
+          <p:cNvPr id="224" name="Google Shape;224;p34"/>
           <p:cNvSpPr txBox="1"/>
           <p:nvPr/>
         </p:nvSpPr>
@@ -12077,7 +12105,7 @@
       </p:sp>
       <p:sp>
         <p:nvSpPr>
-          <p:cNvPr id="216" name="Google Shape;216;p34"/>
+          <p:cNvPr id="217" name="Google Shape;217;p34"/>
           <p:cNvSpPr/>
           <p:nvPr/>
         </p:nvSpPr>
@@ -12125,7 +12153,7 @@
       </p:sp>
       <p:sp>
         <p:nvSpPr>
-          <p:cNvPr id="224" name="Google Shape;224;p34"/>
+          <p:cNvPr id="225" name="Google Shape;225;p34"/>
           <p:cNvSpPr txBox="1"/>
           <p:nvPr>
             <p:ph idx="1" type="body"/>
@@ -12165,7 +12193,7 @@
       </p:sp>
       <p:sp>
         <p:nvSpPr>
-          <p:cNvPr id="225" name="Google Shape;225;p34"/>
+          <p:cNvPr id="226" name="Google Shape;226;p34"/>
           <p:cNvSpPr txBox="1"/>
           <p:nvPr>
             <p:ph idx="1" type="body"/>
@@ -12205,7 +12233,7 @@
       </p:sp>
       <p:sp>
         <p:nvSpPr>
-          <p:cNvPr id="226" name="Google Shape;226;p34"/>
+          <p:cNvPr id="227" name="Google Shape;227;p34"/>
           <p:cNvSpPr txBox="1"/>
           <p:nvPr/>
         </p:nvSpPr>
@@ -12288,7 +12316,7 @@
   <p:cSld>
     <p:spTree>
       <p:nvGrpSpPr>
-        <p:cNvPr id="230" name="Shape 230"/>
+        <p:cNvPr id="231" name="Shape 231"/>
         <p:cNvGrpSpPr/>
         <p:nvPr/>
       </p:nvGrpSpPr>
@@ -12302,7 +12330,7 @@
       </p:grpSpPr>
       <p:sp>
         <p:nvSpPr>
-          <p:cNvPr id="231" name="Google Shape;231;p35"/>
+          <p:cNvPr id="232" name="Google Shape;232;p35"/>
           <p:cNvSpPr txBox="1"/>
           <p:nvPr>
             <p:ph type="title"/>
@@ -12342,7 +12370,7 @@
       </p:sp>
       <p:sp>
         <p:nvSpPr>
-          <p:cNvPr id="232" name="Google Shape;232;p35"/>
+          <p:cNvPr id="233" name="Google Shape;233;p35"/>
           <p:cNvSpPr txBox="1"/>
           <p:nvPr>
             <p:ph idx="1" type="body"/>
@@ -12444,7 +12472,7 @@
   <p:cSld>
     <p:spTree>
       <p:nvGrpSpPr>
-        <p:cNvPr id="236" name="Shape 236"/>
+        <p:cNvPr id="237" name="Shape 237"/>
         <p:cNvGrpSpPr/>
         <p:nvPr/>
       </p:nvGrpSpPr>
@@ -12458,7 +12486,7 @@
       </p:grpSpPr>
       <p:sp>
         <p:nvSpPr>
-          <p:cNvPr id="237" name="Google Shape;237;p36"/>
+          <p:cNvPr id="238" name="Google Shape;238;p36"/>
           <p:cNvSpPr txBox="1"/>
           <p:nvPr>
             <p:ph type="title"/>
@@ -12498,7 +12526,7 @@
       </p:sp>
       <p:sp>
         <p:nvSpPr>
-          <p:cNvPr id="238" name="Google Shape;238;p36"/>
+          <p:cNvPr id="239" name="Google Shape;239;p36"/>
           <p:cNvSpPr txBox="1"/>
           <p:nvPr>
             <p:ph idx="1" type="body"/>
@@ -12538,7 +12566,7 @@
       </p:sp>
       <p:sp>
         <p:nvSpPr>
-          <p:cNvPr id="239" name="Google Shape;239;p36"/>
+          <p:cNvPr id="240" name="Google Shape;240;p36"/>
           <p:cNvSpPr/>
           <p:nvPr/>
         </p:nvSpPr>
@@ -12586,7 +12614,7 @@
       </p:sp>
       <p:sp>
         <p:nvSpPr>
-          <p:cNvPr id="240" name="Google Shape;240;p36"/>
+          <p:cNvPr id="241" name="Google Shape;241;p36"/>
           <p:cNvSpPr/>
           <p:nvPr/>
         </p:nvSpPr>
@@ -12634,7 +12662,7 @@
       </p:sp>
       <p:cxnSp>
         <p:nvCxnSpPr>
-          <p:cNvPr id="241" name="Google Shape;241;p36"/>
+          <p:cNvPr id="242" name="Google Shape;242;p36"/>
           <p:cNvCxnSpPr/>
           <p:nvPr/>
         </p:nvCxnSpPr>
@@ -12660,7 +12688,7 @@
       </p:cxnSp>
       <p:sp>
         <p:nvSpPr>
-          <p:cNvPr id="242" name="Google Shape;242;p36"/>
+          <p:cNvPr id="243" name="Google Shape;243;p36"/>
           <p:cNvSpPr txBox="1"/>
           <p:nvPr/>
         </p:nvSpPr>
@@ -12712,7 +12740,7 @@
       </p:sp>
       <p:sp>
         <p:nvSpPr>
-          <p:cNvPr id="243" name="Google Shape;243;p36"/>
+          <p:cNvPr id="244" name="Google Shape;244;p36"/>
           <p:cNvSpPr/>
           <p:nvPr/>
         </p:nvSpPr>
@@ -12760,10 +12788,10 @@
       </p:sp>
       <p:cxnSp>
         <p:nvCxnSpPr>
-          <p:cNvPr id="244" name="Google Shape;244;p36"/>
+          <p:cNvPr id="245" name="Google Shape;245;p36"/>
           <p:cNvCxnSpPr>
-            <a:stCxn id="240" idx="2"/>
-            <a:endCxn id="243" idx="1"/>
+            <a:stCxn id="241" idx="2"/>
+            <a:endCxn id="244" idx="1"/>
           </p:cNvCxnSpPr>
           <p:nvPr/>
         </p:nvCxnSpPr>
@@ -12789,10 +12817,10 @@
       </p:cxnSp>
       <p:cxnSp>
         <p:nvCxnSpPr>
-          <p:cNvPr id="245" name="Google Shape;245;p36"/>
+          <p:cNvPr id="246" name="Google Shape;246;p36"/>
           <p:cNvCxnSpPr>
-            <a:stCxn id="239" idx="2"/>
-            <a:endCxn id="246" idx="1"/>
+            <a:stCxn id="240" idx="2"/>
+            <a:endCxn id="247" idx="1"/>
           </p:cNvCxnSpPr>
           <p:nvPr/>
         </p:nvCxnSpPr>
@@ -12818,10 +12846,10 @@
       </p:cxnSp>
       <p:cxnSp>
         <p:nvCxnSpPr>
-          <p:cNvPr id="247" name="Google Shape;247;p36"/>
+          <p:cNvPr id="248" name="Google Shape;248;p36"/>
           <p:cNvCxnSpPr>
-            <a:stCxn id="243" idx="0"/>
-            <a:endCxn id="246" idx="1"/>
+            <a:stCxn id="244" idx="0"/>
+            <a:endCxn id="247" idx="1"/>
           </p:cNvCxnSpPr>
           <p:nvPr/>
         </p:nvCxnSpPr>
@@ -12847,7 +12875,7 @@
       </p:cxnSp>
       <p:sp>
         <p:nvSpPr>
-          <p:cNvPr id="248" name="Google Shape;248;p36"/>
+          <p:cNvPr id="249" name="Google Shape;249;p36"/>
           <p:cNvSpPr/>
           <p:nvPr/>
         </p:nvSpPr>
@@ -12895,9 +12923,9 @@
       </p:sp>
       <p:cxnSp>
         <p:nvCxnSpPr>
-          <p:cNvPr id="249" name="Google Shape;249;p36"/>
+          <p:cNvPr id="250" name="Google Shape;250;p36"/>
           <p:cNvCxnSpPr>
-            <a:endCxn id="240" idx="1"/>
+            <a:endCxn id="241" idx="1"/>
           </p:cNvCxnSpPr>
           <p:nvPr/>
         </p:nvCxnSpPr>
@@ -12923,7 +12951,7 @@
       </p:cxnSp>
       <p:sp>
         <p:nvSpPr>
-          <p:cNvPr id="246" name="Google Shape;246;p36"/>
+          <p:cNvPr id="247" name="Google Shape;247;p36"/>
           <p:cNvSpPr/>
           <p:nvPr/>
         </p:nvSpPr>
@@ -12971,7 +12999,7 @@
       </p:sp>
       <p:sp>
         <p:nvSpPr>
-          <p:cNvPr id="250" name="Google Shape;250;p36"/>
+          <p:cNvPr id="251" name="Google Shape;251;p36"/>
           <p:cNvSpPr/>
           <p:nvPr/>
         </p:nvSpPr>
@@ -13019,10 +13047,10 @@
       </p:sp>
       <p:cxnSp>
         <p:nvCxnSpPr>
-          <p:cNvPr id="251" name="Google Shape;251;p36"/>
+          <p:cNvPr id="252" name="Google Shape;252;p36"/>
           <p:cNvCxnSpPr>
-            <a:stCxn id="246" idx="3"/>
-            <a:endCxn id="248" idx="1"/>
+            <a:stCxn id="247" idx="3"/>
+            <a:endCxn id="249" idx="1"/>
           </p:cNvCxnSpPr>
           <p:nvPr/>
         </p:nvCxnSpPr>
@@ -13048,10 +13076,10 @@
       </p:cxnSp>
       <p:cxnSp>
         <p:nvCxnSpPr>
-          <p:cNvPr id="252" name="Google Shape;252;p36"/>
+          <p:cNvPr id="253" name="Google Shape;253;p36"/>
           <p:cNvCxnSpPr>
-            <a:stCxn id="248" idx="2"/>
-            <a:endCxn id="250" idx="3"/>
+            <a:stCxn id="249" idx="2"/>
+            <a:endCxn id="251" idx="3"/>
           </p:cNvCxnSpPr>
           <p:nvPr/>
         </p:nvCxnSpPr>
@@ -13077,10 +13105,10 @@
       </p:cxnSp>
       <p:cxnSp>
         <p:nvCxnSpPr>
-          <p:cNvPr id="253" name="Google Shape;253;p36"/>
+          <p:cNvPr id="254" name="Google Shape;254;p36"/>
           <p:cNvCxnSpPr>
-            <a:stCxn id="250" idx="1"/>
-            <a:endCxn id="246" idx="2"/>
+            <a:stCxn id="251" idx="1"/>
+            <a:endCxn id="247" idx="2"/>
           </p:cNvCxnSpPr>
           <p:nvPr/>
         </p:nvCxnSpPr>
@@ -13106,7 +13134,7 @@
       </p:cxnSp>
       <p:sp>
         <p:nvSpPr>
-          <p:cNvPr id="254" name="Google Shape;254;p36"/>
+          <p:cNvPr id="255" name="Google Shape;255;p36"/>
           <p:cNvSpPr txBox="1"/>
           <p:nvPr/>
         </p:nvSpPr>
@@ -13178,7 +13206,7 @@
       </p:sp>
       <p:sp>
         <p:nvSpPr>
-          <p:cNvPr id="255" name="Google Shape;255;p36"/>
+          <p:cNvPr id="256" name="Google Shape;256;p36"/>
           <p:cNvSpPr txBox="1"/>
           <p:nvPr/>
         </p:nvSpPr>
@@ -13250,7 +13278,7 @@
       </p:sp>
       <p:cxnSp>
         <p:nvCxnSpPr>
-          <p:cNvPr id="256" name="Google Shape;256;p36"/>
+          <p:cNvPr id="257" name="Google Shape;257;p36"/>
           <p:cNvCxnSpPr/>
           <p:nvPr/>
         </p:nvCxnSpPr>
@@ -13276,7 +13304,7 @@
       </p:cxnSp>
       <p:cxnSp>
         <p:nvCxnSpPr>
-          <p:cNvPr id="257" name="Google Shape;257;p36"/>
+          <p:cNvPr id="258" name="Google Shape;258;p36"/>
           <p:cNvCxnSpPr/>
           <p:nvPr/>
         </p:nvCxnSpPr>
@@ -13302,7 +13330,7 @@
       </p:cxnSp>
       <p:sp>
         <p:nvSpPr>
-          <p:cNvPr id="258" name="Google Shape;258;p36"/>
+          <p:cNvPr id="259" name="Google Shape;259;p36"/>
           <p:cNvSpPr/>
           <p:nvPr/>
         </p:nvSpPr>
@@ -13350,7 +13378,7 @@
       </p:sp>
       <p:sp>
         <p:nvSpPr>
-          <p:cNvPr id="259" name="Google Shape;259;p36"/>
+          <p:cNvPr id="260" name="Google Shape;260;p36"/>
           <p:cNvSpPr txBox="1"/>
           <p:nvPr/>
         </p:nvSpPr>
@@ -13433,7 +13461,7 @@
   <p:cSld>
     <p:spTree>
       <p:nvGrpSpPr>
-        <p:cNvPr id="263" name="Shape 263"/>
+        <p:cNvPr id="264" name="Shape 264"/>
         <p:cNvGrpSpPr/>
         <p:nvPr/>
       </p:nvGrpSpPr>
@@ -13447,7 +13475,7 @@
       </p:grpSpPr>
       <p:sp>
         <p:nvSpPr>
-          <p:cNvPr id="264" name="Google Shape;264;p37"/>
+          <p:cNvPr id="265" name="Google Shape;265;p37"/>
           <p:cNvSpPr txBox="1"/>
           <p:nvPr>
             <p:ph type="title"/>
@@ -13487,7 +13515,7 @@
       </p:sp>
       <p:sp>
         <p:nvSpPr>
-          <p:cNvPr id="265" name="Google Shape;265;p37"/>
+          <p:cNvPr id="266" name="Google Shape;266;p37"/>
           <p:cNvSpPr txBox="1"/>
           <p:nvPr>
             <p:ph idx="1" type="body"/>
@@ -13527,7 +13555,7 @@
       </p:sp>
       <p:sp>
         <p:nvSpPr>
-          <p:cNvPr id="266" name="Google Shape;266;p37"/>
+          <p:cNvPr id="267" name="Google Shape;267;p37"/>
           <p:cNvSpPr/>
           <p:nvPr/>
         </p:nvSpPr>
@@ -13575,7 +13603,7 @@
       </p:sp>
       <p:sp>
         <p:nvSpPr>
-          <p:cNvPr id="267" name="Google Shape;267;p37"/>
+          <p:cNvPr id="268" name="Google Shape;268;p37"/>
           <p:cNvSpPr/>
           <p:nvPr/>
         </p:nvSpPr>
@@ -13623,7 +13651,7 @@
       </p:sp>
       <p:sp>
         <p:nvSpPr>
-          <p:cNvPr id="268" name="Google Shape;268;p37"/>
+          <p:cNvPr id="269" name="Google Shape;269;p37"/>
           <p:cNvSpPr/>
           <p:nvPr/>
         </p:nvSpPr>
@@ -13671,7 +13699,7 @@
       </p:sp>
       <p:sp>
         <p:nvSpPr>
-          <p:cNvPr id="269" name="Google Shape;269;p37"/>
+          <p:cNvPr id="270" name="Google Shape;270;p37"/>
           <p:cNvSpPr/>
           <p:nvPr/>
         </p:nvSpPr>
@@ -13719,10 +13747,10 @@
       </p:sp>
       <p:cxnSp>
         <p:nvCxnSpPr>
-          <p:cNvPr id="270" name="Google Shape;270;p37"/>
+          <p:cNvPr id="271" name="Google Shape;271;p37"/>
           <p:cNvCxnSpPr>
-            <a:stCxn id="266" idx="3"/>
-            <a:endCxn id="267" idx="1"/>
+            <a:stCxn id="267" idx="3"/>
+            <a:endCxn id="268" idx="1"/>
           </p:cNvCxnSpPr>
           <p:nvPr/>
         </p:nvCxnSpPr>
@@ -13748,10 +13776,10 @@
       </p:cxnSp>
       <p:cxnSp>
         <p:nvCxnSpPr>
-          <p:cNvPr id="271" name="Google Shape;271;p37"/>
+          <p:cNvPr id="272" name="Google Shape;272;p37"/>
           <p:cNvCxnSpPr>
-            <a:stCxn id="267" idx="3"/>
-            <a:endCxn id="269" idx="1"/>
+            <a:stCxn id="268" idx="3"/>
+            <a:endCxn id="270" idx="1"/>
           </p:cNvCxnSpPr>
           <p:nvPr/>
         </p:nvCxnSpPr>
@@ -13777,10 +13805,10 @@
       </p:cxnSp>
       <p:cxnSp>
         <p:nvCxnSpPr>
-          <p:cNvPr id="272" name="Google Shape;272;p37"/>
+          <p:cNvPr id="273" name="Google Shape;273;p37"/>
           <p:cNvCxnSpPr>
-            <a:stCxn id="269" idx="3"/>
-            <a:endCxn id="268" idx="1"/>
+            <a:stCxn id="270" idx="3"/>
+            <a:endCxn id="269" idx="1"/>
           </p:cNvCxnSpPr>
           <p:nvPr/>
         </p:nvCxnSpPr>
@@ -13806,9 +13834,9 @@
       </p:cxnSp>
       <p:cxnSp>
         <p:nvCxnSpPr>
-          <p:cNvPr id="273" name="Google Shape;273;p37"/>
+          <p:cNvPr id="274" name="Google Shape;274;p37"/>
           <p:cNvCxnSpPr>
-            <a:stCxn id="268" idx="3"/>
+            <a:stCxn id="269" idx="3"/>
           </p:cNvCxnSpPr>
           <p:nvPr/>
         </p:nvCxnSpPr>
@@ -13834,7 +13862,7 @@
       </p:cxnSp>
       <p:cxnSp>
         <p:nvCxnSpPr>
-          <p:cNvPr id="274" name="Google Shape;274;p37"/>
+          <p:cNvPr id="275" name="Google Shape;275;p37"/>
           <p:cNvCxnSpPr/>
           <p:nvPr/>
         </p:nvCxnSpPr>
@@ -13871,7 +13899,7 @@
   <p:cSld>
     <p:spTree>
       <p:nvGrpSpPr>
-        <p:cNvPr id="278" name="Shape 278"/>
+        <p:cNvPr id="279" name="Shape 279"/>
         <p:cNvGrpSpPr/>
         <p:nvPr/>
       </p:nvGrpSpPr>
@@ -13885,7 +13913,7 @@
       </p:grpSpPr>
       <p:sp>
         <p:nvSpPr>
-          <p:cNvPr id="279" name="Google Shape;279;p38"/>
+          <p:cNvPr id="280" name="Google Shape;280;p38"/>
           <p:cNvSpPr txBox="1"/>
           <p:nvPr>
             <p:ph type="title"/>
@@ -13925,7 +13953,7 @@
       </p:sp>
       <p:sp>
         <p:nvSpPr>
-          <p:cNvPr id="280" name="Google Shape;280;p38"/>
+          <p:cNvPr id="281" name="Google Shape;281;p38"/>
           <p:cNvSpPr txBox="1"/>
           <p:nvPr>
             <p:ph idx="1" type="body"/>
@@ -13998,7 +14026,7 @@
       </p:sp>
       <p:sp>
         <p:nvSpPr>
-          <p:cNvPr id="281" name="Google Shape;281;p38"/>
+          <p:cNvPr id="282" name="Google Shape;282;p38"/>
           <p:cNvSpPr txBox="1"/>
           <p:nvPr/>
         </p:nvSpPr>
@@ -15094,6 +15122,285 @@
 </file>
 
 <file path=ppt/theme/theme1.xml><?xml version="1.0" encoding="utf-8"?>
+<a:theme xmlns:a="http://schemas.openxmlformats.org/drawingml/2006/main" xmlns:r="http://schemas.openxmlformats.org/officeDocument/2006/relationships" name="Material">
+  <a:themeElements>
+    <a:clrScheme name="Material">
+      <a:dk1>
+        <a:srgbClr val="4285F4"/>
+      </a:dk1>
+      <a:lt1>
+        <a:srgbClr val="FFFFFF"/>
+      </a:lt1>
+      <a:dk2>
+        <a:srgbClr val="424242"/>
+      </a:dk2>
+      <a:lt2>
+        <a:srgbClr val="737373"/>
+      </a:lt2>
+      <a:accent1>
+        <a:srgbClr val="0277BD"/>
+      </a:accent1>
+      <a:accent2>
+        <a:srgbClr val="0F9D58"/>
+      </a:accent2>
+      <a:accent3>
+        <a:srgbClr val="DB4437"/>
+      </a:accent3>
+      <a:accent4>
+        <a:srgbClr val="FAFAFA"/>
+      </a:accent4>
+      <a:accent5>
+        <a:srgbClr val="4FC3F7"/>
+      </a:accent5>
+      <a:accent6>
+        <a:srgbClr val="F4B400"/>
+      </a:accent6>
+      <a:hlink>
+        <a:srgbClr val="4FC3F7"/>
+      </a:hlink>
+      <a:folHlink>
+        <a:srgbClr val="4FC3F7"/>
+      </a:folHlink>
+    </a:clrScheme>
+    <a:fontScheme name="Office">
+      <a:majorFont>
+        <a:latin typeface="Arial"/>
+        <a:ea typeface=""/>
+        <a:cs typeface=""/>
+        <a:font script="Jpan" typeface="ＭＳ Ｐゴシック"/>
+        <a:font script="Hang" typeface="맑은 고딕"/>
+        <a:font script="Hans" typeface="宋体"/>
+        <a:font script="Hant" typeface="新細明體"/>
+        <a:font script="Arab" typeface="Times New Roman"/>
+        <a:font script="Hebr" typeface="Times New Roman"/>
+        <a:font script="Thai" typeface="Angsana New"/>
+        <a:font script="Ethi" typeface="Nyala"/>
+        <a:font script="Beng" typeface="Vrinda"/>
+        <a:font script="Gujr" typeface="Shruti"/>
+        <a:font script="Khmr" typeface="MoolBoran"/>
+        <a:font script="Knda" typeface="Tunga"/>
+        <a:font script="Guru" typeface="Raavi"/>
+        <a:font script="Cans" typeface="Euphemia"/>
+        <a:font script="Cher" typeface="Plantagenet Cherokee"/>
+        <a:font script="Yiii" typeface="Microsoft Yi Baiti"/>
+        <a:font script="Tibt" typeface="Microsoft Himalaya"/>
+        <a:font script="Thaa" typeface="MV Boli"/>
+        <a:font script="Deva" typeface="Mangal"/>
+        <a:font script="Telu" typeface="Gautami"/>
+        <a:font script="Taml" typeface="Latha"/>
+        <a:font script="Syrc" typeface="Estrangelo Edessa"/>
+        <a:font script="Orya" typeface="Kalinga"/>
+        <a:font script="Mlym" typeface="Kartika"/>
+        <a:font script="Laoo" typeface="DokChampa"/>
+        <a:font script="Sinh" typeface="Iskoola Pota"/>
+        <a:font script="Mong" typeface="Mongolian Baiti"/>
+        <a:font script="Viet" typeface="Times New Roman"/>
+        <a:font script="Uigh" typeface="Microsoft Uighur"/>
+        <a:font script="Geor" typeface="Sylfaen"/>
+      </a:majorFont>
+      <a:minorFont>
+        <a:latin typeface="Arial"/>
+        <a:ea typeface=""/>
+        <a:cs typeface=""/>
+        <a:font script="Jpan" typeface="ＭＳ Ｐゴシック"/>
+        <a:font script="Hang" typeface="맑은 고딕"/>
+        <a:font script="Hans" typeface="宋体"/>
+        <a:font script="Hant" typeface="新細明體"/>
+        <a:font script="Arab" typeface="Arial"/>
+        <a:font script="Hebr" typeface="Arial"/>
+        <a:font script="Thai" typeface="Cordia New"/>
+        <a:font script="Ethi" typeface="Nyala"/>
+        <a:font script="Beng" typeface="Vrinda"/>
+        <a:font script="Gujr" typeface="Shruti"/>
+        <a:font script="Khmr" typeface="DaunPenh"/>
+        <a:font script="Knda" typeface="Tunga"/>
+        <a:font script="Guru" typeface="Raavi"/>
+        <a:font script="Cans" typeface="Euphemia"/>
+        <a:font script="Cher" typeface="Plantagenet Cherokee"/>
+        <a:font script="Yiii" typeface="Microsoft Yi Baiti"/>
+        <a:font script="Tibt" typeface="Microsoft Himalaya"/>
+        <a:font script="Thaa" typeface="MV Boli"/>
+        <a:font script="Deva" typeface="Mangal"/>
+        <a:font script="Telu" typeface="Gautami"/>
+        <a:font script="Taml" typeface="Latha"/>
+        <a:font script="Syrc" typeface="Estrangelo Edessa"/>
+        <a:font script="Orya" typeface="Kalinga"/>
+        <a:font script="Mlym" typeface="Kartika"/>
+        <a:font script="Laoo" typeface="DokChampa"/>
+        <a:font script="Sinh" typeface="Iskoola Pota"/>
+        <a:font script="Mong" typeface="Mongolian Baiti"/>
+        <a:font script="Viet" typeface="Arial"/>
+        <a:font script="Uigh" typeface="Microsoft Uighur"/>
+        <a:font script="Geor" typeface="Sylfaen"/>
+      </a:minorFont>
+    </a:fontScheme>
+    <a:fmtScheme name="Office">
+      <a:fillStyleLst>
+        <a:solidFill>
+          <a:schemeClr val="phClr"/>
+        </a:solidFill>
+        <a:gradFill rotWithShape="1">
+          <a:gsLst>
+            <a:gs pos="0">
+              <a:schemeClr val="phClr">
+                <a:tint val="50000"/>
+                <a:satMod val="300000"/>
+              </a:schemeClr>
+            </a:gs>
+            <a:gs pos="35000">
+              <a:schemeClr val="phClr">
+                <a:tint val="37000"/>
+                <a:satMod val="300000"/>
+              </a:schemeClr>
+            </a:gs>
+            <a:gs pos="100000">
+              <a:schemeClr val="phClr">
+                <a:tint val="15000"/>
+                <a:satMod val="350000"/>
+              </a:schemeClr>
+            </a:gs>
+          </a:gsLst>
+          <a:lin ang="16200000" scaled="1"/>
+        </a:gradFill>
+        <a:gradFill rotWithShape="1">
+          <a:gsLst>
+            <a:gs pos="0">
+              <a:schemeClr val="phClr">
+                <a:tint val="100000"/>
+                <a:shade val="100000"/>
+                <a:satMod val="130000"/>
+              </a:schemeClr>
+            </a:gs>
+            <a:gs pos="100000">
+              <a:schemeClr val="phClr">
+                <a:tint val="50000"/>
+                <a:shade val="100000"/>
+                <a:satMod val="350000"/>
+              </a:schemeClr>
+            </a:gs>
+          </a:gsLst>
+          <a:lin ang="16200000" scaled="0"/>
+        </a:gradFill>
+      </a:fillStyleLst>
+      <a:lnStyleLst>
+        <a:ln w="9525" cap="flat" cmpd="sng" algn="ctr">
+          <a:solidFill>
+            <a:schemeClr val="phClr">
+              <a:shade val="95000"/>
+              <a:satMod val="105000"/>
+            </a:schemeClr>
+          </a:solidFill>
+          <a:prstDash val="solid"/>
+        </a:ln>
+        <a:ln w="25400" cap="flat" cmpd="sng" algn="ctr">
+          <a:solidFill>
+            <a:schemeClr val="phClr"/>
+          </a:solidFill>
+          <a:prstDash val="solid"/>
+        </a:ln>
+        <a:ln w="38100" cap="flat" cmpd="sng" algn="ctr">
+          <a:solidFill>
+            <a:schemeClr val="phClr"/>
+          </a:solidFill>
+          <a:prstDash val="solid"/>
+        </a:ln>
+      </a:lnStyleLst>
+      <a:effectStyleLst>
+        <a:effectStyle>
+          <a:effectLst>
+            <a:outerShdw blurRad="40000" dist="20000" dir="5400000" rotWithShape="0">
+              <a:srgbClr val="000000">
+                <a:alpha val="38000"/>
+              </a:srgbClr>
+            </a:outerShdw>
+          </a:effectLst>
+        </a:effectStyle>
+        <a:effectStyle>
+          <a:effectLst>
+            <a:outerShdw blurRad="40000" dist="23000" dir="5400000" rotWithShape="0">
+              <a:srgbClr val="000000">
+                <a:alpha val="35000"/>
+              </a:srgbClr>
+            </a:outerShdw>
+          </a:effectLst>
+        </a:effectStyle>
+        <a:effectStyle>
+          <a:effectLst>
+            <a:outerShdw blurRad="40000" dist="23000" dir="5400000" rotWithShape="0">
+              <a:srgbClr val="000000">
+                <a:alpha val="35000"/>
+              </a:srgbClr>
+            </a:outerShdw>
+          </a:effectLst>
+          <a:scene3d>
+            <a:camera prst="orthographicFront">
+              <a:rot lat="0" lon="0" rev="0"/>
+            </a:camera>
+            <a:lightRig rig="threePt" dir="t">
+              <a:rot lat="0" lon="0" rev="1200000"/>
+            </a:lightRig>
+          </a:scene3d>
+          <a:sp3d>
+            <a:bevelT w="63500" h="25400"/>
+          </a:sp3d>
+        </a:effectStyle>
+      </a:effectStyleLst>
+      <a:bgFillStyleLst>
+        <a:solidFill>
+          <a:schemeClr val="phClr"/>
+        </a:solidFill>
+        <a:gradFill rotWithShape="1">
+          <a:gsLst>
+            <a:gs pos="0">
+              <a:schemeClr val="phClr">
+                <a:tint val="40000"/>
+                <a:satMod val="350000"/>
+              </a:schemeClr>
+            </a:gs>
+            <a:gs pos="40000">
+              <a:schemeClr val="phClr">
+                <a:tint val="45000"/>
+                <a:shade val="99000"/>
+                <a:satMod val="350000"/>
+              </a:schemeClr>
+            </a:gs>
+            <a:gs pos="100000">
+              <a:schemeClr val="phClr">
+                <a:shade val="20000"/>
+                <a:satMod val="255000"/>
+              </a:schemeClr>
+            </a:gs>
+          </a:gsLst>
+          <a:path path="circle">
+            <a:fillToRect l="50000" t="-80000" r="50000" b="180000"/>
+          </a:path>
+        </a:gradFill>
+        <a:gradFill rotWithShape="1">
+          <a:gsLst>
+            <a:gs pos="0">
+              <a:schemeClr val="phClr">
+                <a:tint val="80000"/>
+                <a:satMod val="300000"/>
+              </a:schemeClr>
+            </a:gs>
+            <a:gs pos="100000">
+              <a:schemeClr val="phClr">
+                <a:shade val="30000"/>
+                <a:satMod val="200000"/>
+              </a:schemeClr>
+            </a:gs>
+          </a:gsLst>
+          <a:path path="circle">
+            <a:fillToRect l="50000" t="50000" r="50000" b="50000"/>
+          </a:path>
+        </a:gradFill>
+      </a:bgFillStyleLst>
+    </a:fmtScheme>
+  </a:themeElements>
+</a:theme>
+</file>
+
+<file path=ppt/theme/theme2.xml><?xml version="1.0" encoding="utf-8"?>
 <a:theme xmlns:a="http://schemas.openxmlformats.org/drawingml/2006/main" xmlns:r="http://schemas.openxmlformats.org/officeDocument/2006/relationships">
   <a:themeElements>
     <a:clrScheme name="Default">
@@ -15370,283 +15677,4 @@
     </a:fmtScheme>
   </a:themeElements>
 </a:theme>
-</file>
-
-<file path=ppt/theme/theme2.xml><?xml version="1.0" encoding="utf-8"?>
-<a:theme xmlns:a="http://schemas.openxmlformats.org/drawingml/2006/main" xmlns:r="http://schemas.openxmlformats.org/officeDocument/2006/relationships" name="Material">
-  <a:themeElements>
-    <a:clrScheme name="Material">
-      <a:dk1>
-        <a:srgbClr val="4285F4"/>
-      </a:dk1>
-      <a:lt1>
-        <a:srgbClr val="FFFFFF"/>
-      </a:lt1>
-      <a:dk2>
-        <a:srgbClr val="424242"/>
-      </a:dk2>
-      <a:lt2>
-        <a:srgbClr val="737373"/>
-      </a:lt2>
-      <a:accent1>
-        <a:srgbClr val="0277BD"/>
-      </a:accent1>
-      <a:accent2>
-        <a:srgbClr val="0F9D58"/>
-      </a:accent2>
-      <a:accent3>
-        <a:srgbClr val="DB4437"/>
-      </a:accent3>
-      <a:accent4>
-        <a:srgbClr val="FAFAFA"/>
-      </a:accent4>
-      <a:accent5>
-        <a:srgbClr val="4FC3F7"/>
-      </a:accent5>
-      <a:accent6>
-        <a:srgbClr val="F4B400"/>
-      </a:accent6>
-      <a:hlink>
-        <a:srgbClr val="4FC3F7"/>
-      </a:hlink>
-      <a:folHlink>
-        <a:srgbClr val="4FC3F7"/>
-      </a:folHlink>
-    </a:clrScheme>
-    <a:fontScheme name="Office">
-      <a:majorFont>
-        <a:latin typeface="Arial"/>
-        <a:ea typeface=""/>
-        <a:cs typeface=""/>
-        <a:font script="Jpan" typeface="ＭＳ Ｐゴシック"/>
-        <a:font script="Hang" typeface="맑은 고딕"/>
-        <a:font script="Hans" typeface="宋体"/>
-        <a:font script="Hant" typeface="新細明體"/>
-        <a:font script="Arab" typeface="Times New Roman"/>
-        <a:font script="Hebr" typeface="Times New Roman"/>
-        <a:font script="Thai" typeface="Angsana New"/>
-        <a:font script="Ethi" typeface="Nyala"/>
-        <a:font script="Beng" typeface="Vrinda"/>
-        <a:font script="Gujr" typeface="Shruti"/>
-        <a:font script="Khmr" typeface="MoolBoran"/>
-        <a:font script="Knda" typeface="Tunga"/>
-        <a:font script="Guru" typeface="Raavi"/>
-        <a:font script="Cans" typeface="Euphemia"/>
-        <a:font script="Cher" typeface="Plantagenet Cherokee"/>
-        <a:font script="Yiii" typeface="Microsoft Yi Baiti"/>
-        <a:font script="Tibt" typeface="Microsoft Himalaya"/>
-        <a:font script="Thaa" typeface="MV Boli"/>
-        <a:font script="Deva" typeface="Mangal"/>
-        <a:font script="Telu" typeface="Gautami"/>
-        <a:font script="Taml" typeface="Latha"/>
-        <a:font script="Syrc" typeface="Estrangelo Edessa"/>
-        <a:font script="Orya" typeface="Kalinga"/>
-        <a:font script="Mlym" typeface="Kartika"/>
-        <a:font script="Laoo" typeface="DokChampa"/>
-        <a:font script="Sinh" typeface="Iskoola Pota"/>
-        <a:font script="Mong" typeface="Mongolian Baiti"/>
-        <a:font script="Viet" typeface="Times New Roman"/>
-        <a:font script="Uigh" typeface="Microsoft Uighur"/>
-        <a:font script="Geor" typeface="Sylfaen"/>
-      </a:majorFont>
-      <a:minorFont>
-        <a:latin typeface="Arial"/>
-        <a:ea typeface=""/>
-        <a:cs typeface=""/>
-        <a:font script="Jpan" typeface="ＭＳ Ｐゴシック"/>
-        <a:font script="Hang" typeface="맑은 고딕"/>
-        <a:font script="Hans" typeface="宋体"/>
-        <a:font script="Hant" typeface="新細明體"/>
-        <a:font script="Arab" typeface="Arial"/>
-        <a:font script="Hebr" typeface="Arial"/>
-        <a:font script="Thai" typeface="Cordia New"/>
-        <a:font script="Ethi" typeface="Nyala"/>
-        <a:font script="Beng" typeface="Vrinda"/>
-        <a:font script="Gujr" typeface="Shruti"/>
-        <a:font script="Khmr" typeface="DaunPenh"/>
-        <a:font script="Knda" typeface="Tunga"/>
-        <a:font script="Guru" typeface="Raavi"/>
-        <a:font script="Cans" typeface="Euphemia"/>
-        <a:font script="Cher" typeface="Plantagenet Cherokee"/>
-        <a:font script="Yiii" typeface="Microsoft Yi Baiti"/>
-        <a:font script="Tibt" typeface="Microsoft Himalaya"/>
-        <a:font script="Thaa" typeface="MV Boli"/>
-        <a:font script="Deva" typeface="Mangal"/>
-        <a:font script="Telu" typeface="Gautami"/>
-        <a:font script="Taml" typeface="Latha"/>
-        <a:font script="Syrc" typeface="Estrangelo Edessa"/>
-        <a:font script="Orya" typeface="Kalinga"/>
-        <a:font script="Mlym" typeface="Kartika"/>
-        <a:font script="Laoo" typeface="DokChampa"/>
-        <a:font script="Sinh" typeface="Iskoola Pota"/>
-        <a:font script="Mong" typeface="Mongolian Baiti"/>
-        <a:font script="Viet" typeface="Arial"/>
-        <a:font script="Uigh" typeface="Microsoft Uighur"/>
-        <a:font script="Geor" typeface="Sylfaen"/>
-      </a:minorFont>
-    </a:fontScheme>
-    <a:fmtScheme name="Office">
-      <a:fillStyleLst>
-        <a:solidFill>
-          <a:schemeClr val="phClr"/>
-        </a:solidFill>
-        <a:gradFill rotWithShape="1">
-          <a:gsLst>
-            <a:gs pos="0">
-              <a:schemeClr val="phClr">
-                <a:tint val="50000"/>
-                <a:satMod val="300000"/>
-              </a:schemeClr>
-            </a:gs>
-            <a:gs pos="35000">
-              <a:schemeClr val="phClr">
-                <a:tint val="37000"/>
-                <a:satMod val="300000"/>
-              </a:schemeClr>
-            </a:gs>
-            <a:gs pos="100000">
-              <a:schemeClr val="phClr">
-                <a:tint val="15000"/>
-                <a:satMod val="350000"/>
-              </a:schemeClr>
-            </a:gs>
-          </a:gsLst>
-          <a:lin ang="16200000" scaled="1"/>
-        </a:gradFill>
-        <a:gradFill rotWithShape="1">
-          <a:gsLst>
-            <a:gs pos="0">
-              <a:schemeClr val="phClr">
-                <a:tint val="100000"/>
-                <a:shade val="100000"/>
-                <a:satMod val="130000"/>
-              </a:schemeClr>
-            </a:gs>
-            <a:gs pos="100000">
-              <a:schemeClr val="phClr">
-                <a:tint val="50000"/>
-                <a:shade val="100000"/>
-                <a:satMod val="350000"/>
-              </a:schemeClr>
-            </a:gs>
-          </a:gsLst>
-          <a:lin ang="16200000" scaled="0"/>
-        </a:gradFill>
-      </a:fillStyleLst>
-      <a:lnStyleLst>
-        <a:ln w="9525" cap="flat" cmpd="sng" algn="ctr">
-          <a:solidFill>
-            <a:schemeClr val="phClr">
-              <a:shade val="95000"/>
-              <a:satMod val="105000"/>
-            </a:schemeClr>
-          </a:solidFill>
-          <a:prstDash val="solid"/>
-        </a:ln>
-        <a:ln w="25400" cap="flat" cmpd="sng" algn="ctr">
-          <a:solidFill>
-            <a:schemeClr val="phClr"/>
-          </a:solidFill>
-          <a:prstDash val="solid"/>
-        </a:ln>
-        <a:ln w="38100" cap="flat" cmpd="sng" algn="ctr">
-          <a:solidFill>
-            <a:schemeClr val="phClr"/>
-          </a:solidFill>
-          <a:prstDash val="solid"/>
-        </a:ln>
-      </a:lnStyleLst>
-      <a:effectStyleLst>
-        <a:effectStyle>
-          <a:effectLst>
-            <a:outerShdw blurRad="40000" dist="20000" dir="5400000" rotWithShape="0">
-              <a:srgbClr val="000000">
-                <a:alpha val="38000"/>
-              </a:srgbClr>
-            </a:outerShdw>
-          </a:effectLst>
-        </a:effectStyle>
-        <a:effectStyle>
-          <a:effectLst>
-            <a:outerShdw blurRad="40000" dist="23000" dir="5400000" rotWithShape="0">
-              <a:srgbClr val="000000">
-                <a:alpha val="35000"/>
-              </a:srgbClr>
-            </a:outerShdw>
-          </a:effectLst>
-        </a:effectStyle>
-        <a:effectStyle>
-          <a:effectLst>
-            <a:outerShdw blurRad="40000" dist="23000" dir="5400000" rotWithShape="0">
-              <a:srgbClr val="000000">
-                <a:alpha val="35000"/>
-              </a:srgbClr>
-            </a:outerShdw>
-          </a:effectLst>
-          <a:scene3d>
-            <a:camera prst="orthographicFront">
-              <a:rot lat="0" lon="0" rev="0"/>
-            </a:camera>
-            <a:lightRig rig="threePt" dir="t">
-              <a:rot lat="0" lon="0" rev="1200000"/>
-            </a:lightRig>
-          </a:scene3d>
-          <a:sp3d>
-            <a:bevelT w="63500" h="25400"/>
-          </a:sp3d>
-        </a:effectStyle>
-      </a:effectStyleLst>
-      <a:bgFillStyleLst>
-        <a:solidFill>
-          <a:schemeClr val="phClr"/>
-        </a:solidFill>
-        <a:gradFill rotWithShape="1">
-          <a:gsLst>
-            <a:gs pos="0">
-              <a:schemeClr val="phClr">
-                <a:tint val="40000"/>
-                <a:satMod val="350000"/>
-              </a:schemeClr>
-            </a:gs>
-            <a:gs pos="40000">
-              <a:schemeClr val="phClr">
-                <a:tint val="45000"/>
-                <a:shade val="99000"/>
-                <a:satMod val="350000"/>
-              </a:schemeClr>
-            </a:gs>
-            <a:gs pos="100000">
-              <a:schemeClr val="phClr">
-                <a:shade val="20000"/>
-                <a:satMod val="255000"/>
-              </a:schemeClr>
-            </a:gs>
-          </a:gsLst>
-          <a:path path="circle">
-            <a:fillToRect l="50000" t="-80000" r="50000" b="180000"/>
-          </a:path>
-        </a:gradFill>
-        <a:gradFill rotWithShape="1">
-          <a:gsLst>
-            <a:gs pos="0">
-              <a:schemeClr val="phClr">
-                <a:tint val="80000"/>
-                <a:satMod val="300000"/>
-              </a:schemeClr>
-            </a:gs>
-            <a:gs pos="100000">
-              <a:schemeClr val="phClr">
-                <a:shade val="30000"/>
-                <a:satMod val="200000"/>
-              </a:schemeClr>
-            </a:gs>
-          </a:gsLst>
-          <a:path path="circle">
-            <a:fillToRect l="50000" t="50000" r="50000" b="50000"/>
-          </a:path>
-        </a:gradFill>
-      </a:bgFillStyleLst>
-    </a:fmtScheme>
-  </a:themeElements>
-</a:theme>
 </file>
</xml_diff>